<commit_message>
Updated preliminaries and syntax
</commit_message>
<xml_diff>
--- a/preliminaries.pptx
+++ b/preliminaries.pptx
@@ -211,7 +211,7 @@
           <a:p>
             <a:fld id="{B1705F56-3A3C-9F45-82E1-974975E83314}" type="datetimeFigureOut">
               <a:rPr lang="en-US" smtClean="0"/>
-              <a:t>1/12/20</a:t>
+              <a:t>2/12/20</a:t>
             </a:fld>
             <a:endParaRPr lang="en-US"/>
           </a:p>
@@ -625,7 +625,7 @@
           <a:p>
             <a:fld id="{B636A413-A1CC-CD48-9584-751D89CE81E1}" type="datetime1">
               <a:rPr lang="en-US" smtClean="0"/>
-              <a:t>1/12/20</a:t>
+              <a:t>2/12/20</a:t>
             </a:fld>
             <a:endParaRPr lang="en-US"/>
           </a:p>
@@ -826,7 +826,7 @@
           <a:p>
             <a:fld id="{E1354D63-68F0-9647-B536-4263FBF27E9F}" type="datetime1">
               <a:rPr lang="en-US" smtClean="0"/>
-              <a:t>1/12/20</a:t>
+              <a:t>2/12/20</a:t>
             </a:fld>
             <a:endParaRPr lang="en-US"/>
           </a:p>
@@ -1037,7 +1037,7 @@
           <a:p>
             <a:fld id="{F5D9CFB9-61F7-8A4C-AD69-67C2D113D776}" type="datetime1">
               <a:rPr lang="en-US" smtClean="0"/>
-              <a:t>1/12/20</a:t>
+              <a:t>2/12/20</a:t>
             </a:fld>
             <a:endParaRPr lang="en-US"/>
           </a:p>
@@ -1238,7 +1238,7 @@
           <a:p>
             <a:fld id="{FAD571EC-F5A0-FD49-8239-D310E199B9F3}" type="datetime1">
               <a:rPr lang="en-US" smtClean="0"/>
-              <a:t>1/12/20</a:t>
+              <a:t>2/12/20</a:t>
             </a:fld>
             <a:endParaRPr lang="en-US"/>
           </a:p>
@@ -1516,7 +1516,7 @@
           <a:p>
             <a:fld id="{BC16F984-79D0-D341-8C08-3C6D93E11D18}" type="datetime1">
               <a:rPr lang="en-US" smtClean="0"/>
-              <a:t>1/12/20</a:t>
+              <a:t>2/12/20</a:t>
             </a:fld>
             <a:endParaRPr lang="en-US"/>
           </a:p>
@@ -1784,7 +1784,7 @@
           <a:p>
             <a:fld id="{5A5A3D16-5D9A-6D4D-85BF-98D6AFE50F81}" type="datetime1">
               <a:rPr lang="en-US" smtClean="0"/>
-              <a:t>1/12/20</a:t>
+              <a:t>2/12/20</a:t>
             </a:fld>
             <a:endParaRPr lang="en-US"/>
           </a:p>
@@ -2199,7 +2199,7 @@
           <a:p>
             <a:fld id="{FAC4073C-E934-844C-850F-5144159CD358}" type="datetime1">
               <a:rPr lang="en-US" smtClean="0"/>
-              <a:t>1/12/20</a:t>
+              <a:t>2/12/20</a:t>
             </a:fld>
             <a:endParaRPr lang="en-US"/>
           </a:p>
@@ -2343,7 +2343,7 @@
           <a:p>
             <a:fld id="{2BF32EF1-264C-B948-B02C-28DB295F8177}" type="datetime1">
               <a:rPr lang="en-US" smtClean="0"/>
-              <a:t>1/12/20</a:t>
+              <a:t>2/12/20</a:t>
             </a:fld>
             <a:endParaRPr lang="en-US"/>
           </a:p>
@@ -2459,7 +2459,7 @@
           <a:p>
             <a:fld id="{50BD370F-BC0F-4547-BA0C-9B1A91BB0139}" type="datetime1">
               <a:rPr lang="en-US" smtClean="0"/>
-              <a:t>1/12/20</a:t>
+              <a:t>2/12/20</a:t>
             </a:fld>
             <a:endParaRPr lang="en-US"/>
           </a:p>
@@ -2773,7 +2773,7 @@
           <a:p>
             <a:fld id="{410B318A-D3FE-0A45-8302-770BB2BBADA1}" type="datetime1">
               <a:rPr lang="en-US" smtClean="0"/>
-              <a:t>1/12/20</a:t>
+              <a:t>2/12/20</a:t>
             </a:fld>
             <a:endParaRPr lang="en-US"/>
           </a:p>
@@ -3064,7 +3064,7 @@
           <a:p>
             <a:fld id="{71D2B0EA-B374-764B-A3CE-44052DF0C9A6}" type="datetime1">
               <a:rPr lang="en-US" smtClean="0"/>
-              <a:t>1/12/20</a:t>
+              <a:t>2/12/20</a:t>
             </a:fld>
             <a:endParaRPr lang="en-US"/>
           </a:p>
@@ -3308,7 +3308,7 @@
           <a:p>
             <a:fld id="{683A4360-EFAF-A345-A6F4-DC5461235985}" type="datetime1">
               <a:rPr lang="en-US" smtClean="0"/>
-              <a:t>1/12/20</a:t>
+              <a:t>2/12/20</a:t>
             </a:fld>
             <a:endParaRPr lang="en-US"/>
           </a:p>
@@ -5559,28 +5559,16 @@
           </a:p>
           <a:p>
             <a:r>
-              <a:rPr lang="en-US" dirty="0">
-                <a:highlight>
-                  <a:srgbClr val="00FF00"/>
-                </a:highlight>
-              </a:rPr>
+              <a:rPr lang="en-US" dirty="0"/>
               <a:t>February 17</a:t>
             </a:r>
             <a:r>
-              <a:rPr lang="en-US" baseline="30000" dirty="0">
-                <a:highlight>
-                  <a:srgbClr val="00FF00"/>
-                </a:highlight>
-              </a:rPr>
+              <a:rPr lang="en-US" baseline="30000" dirty="0"/>
               <a:t>th</a:t>
             </a:r>
             <a:r>
-              <a:rPr lang="en-US" dirty="0">
-                <a:highlight>
-                  <a:srgbClr val="00FF00"/>
-                </a:highlight>
-              </a:rPr>
-              <a:t> (Presidents’ Day): Holiday </a:t>
+              <a:rPr lang="en-US" dirty="0"/>
+              <a:t> (Presidents’ Day): Not Holiday (My bad) </a:t>
             </a:r>
           </a:p>
           <a:p>
@@ -6226,10 +6214,14 @@
             </a:r>
             <a:r>
               <a:rPr lang="en-US" dirty="0"/>
-              <a:t>, February 3</a:t>
-            </a:r>
-            <a:r>
-              <a:rPr lang="en-US" baseline="30000" dirty="0"/>
+              <a:t>, </a:t>
+            </a:r>
+            <a:r>
+              <a:rPr lang="en-US" strike="sngStrike" dirty="0"/>
+              <a:t>February 3</a:t>
+            </a:r>
+            <a:r>
+              <a:rPr lang="en-US" strike="sngStrike" baseline="30000" dirty="0"/>
               <a:t>rd</a:t>
             </a:r>
             <a:r>
@@ -6250,21 +6242,58 @@
             </a:r>
             <a:r>
               <a:rPr lang="en-US" dirty="0"/>
-              <a:t>, February 26</a:t>
-            </a:r>
-            <a:r>
-              <a:rPr lang="en-US" baseline="30000" dirty="0"/>
+              <a:t>, February </a:t>
+            </a:r>
+            <a:r>
+              <a:rPr lang="en-US"/>
+              <a:t>26</a:t>
+            </a:r>
+            <a:r>
+              <a:rPr lang="en-US" baseline="30000"/>
               <a:t>th</a:t>
             </a:r>
             <a:r>
-              <a:rPr lang="en-US" dirty="0"/>
+              <a:rPr lang="en-US"/>
               <a:t> </a:t>
             </a:r>
-          </a:p>
-          <a:p>
-            <a:r>
-              <a:rPr lang="en-US" dirty="0"/>
-              <a:t>Post-midterm quizzes: April 1</a:t>
+            <a:endParaRPr lang="en-US" b="1" dirty="0">
+              <a:solidFill>
+                <a:srgbClr val="FF0000"/>
+              </a:solidFill>
+            </a:endParaRPr>
+          </a:p>
+          <a:p>
+            <a:r>
+              <a:rPr lang="en-US" dirty="0"/>
+              <a:t>Post-midterm quizzes: </a:t>
+            </a:r>
+            <a:r>
+              <a:rPr lang="en-US" b="1" dirty="0">
+                <a:solidFill>
+                  <a:srgbClr val="FF0000"/>
+                </a:solidFill>
+              </a:rPr>
+              <a:t>March 9</a:t>
+            </a:r>
+            <a:r>
+              <a:rPr lang="en-US" b="1" baseline="30000" dirty="0">
+                <a:solidFill>
+                  <a:srgbClr val="FF0000"/>
+                </a:solidFill>
+              </a:rPr>
+              <a:t>th</a:t>
+            </a:r>
+            <a:r>
+              <a:rPr lang="en-US" b="1" dirty="0">
+                <a:solidFill>
+                  <a:srgbClr val="FF0000"/>
+                </a:solidFill>
+              </a:rPr>
+              <a:t> , </a:t>
+            </a:r>
+            <a:r>
+              <a:rPr lang="en-US" dirty="0"/>
+              <a:t>April 1</a:t>
             </a:r>
             <a:r>
               <a:rPr lang="en-US" baseline="30000" dirty="0"/>

</xml_diff>